<commit_message>
More hymns and things
</commit_message>
<xml_diff>
--- a/310 - Oh Master, Let Me Walk With Thee.pptx
+++ b/310 - Oh Master, Let Me Walk With Thee.pptx
@@ -242,7 +242,7 @@
           <a:p>
             <a:fld id="{32F7251A-AE54-443C-B8FE-5F636E835EBF}" type="datetimeFigureOut">
               <a:rPr lang="en-US" smtClean="0"/>
-              <a:t>3/11/2018</a:t>
+              <a:t>6/3/2018</a:t>
             </a:fld>
             <a:endParaRPr lang="en-US"/>
           </a:p>
@@ -410,7 +410,7 @@
           <a:p>
             <a:fld id="{32F7251A-AE54-443C-B8FE-5F636E835EBF}" type="datetimeFigureOut">
               <a:rPr lang="en-US" smtClean="0"/>
-              <a:t>3/11/2018</a:t>
+              <a:t>6/3/2018</a:t>
             </a:fld>
             <a:endParaRPr lang="en-US"/>
           </a:p>
@@ -588,7 +588,7 @@
           <a:p>
             <a:fld id="{32F7251A-AE54-443C-B8FE-5F636E835EBF}" type="datetimeFigureOut">
               <a:rPr lang="en-US" smtClean="0"/>
-              <a:t>3/11/2018</a:t>
+              <a:t>6/3/2018</a:t>
             </a:fld>
             <a:endParaRPr lang="en-US"/>
           </a:p>
@@ -756,7 +756,7 @@
           <a:p>
             <a:fld id="{32F7251A-AE54-443C-B8FE-5F636E835EBF}" type="datetimeFigureOut">
               <a:rPr lang="en-US" smtClean="0"/>
-              <a:t>3/11/2018</a:t>
+              <a:t>6/3/2018</a:t>
             </a:fld>
             <a:endParaRPr lang="en-US"/>
           </a:p>
@@ -1001,7 +1001,7 @@
           <a:p>
             <a:fld id="{32F7251A-AE54-443C-B8FE-5F636E835EBF}" type="datetimeFigureOut">
               <a:rPr lang="en-US" smtClean="0"/>
-              <a:t>3/11/2018</a:t>
+              <a:t>6/3/2018</a:t>
             </a:fld>
             <a:endParaRPr lang="en-US"/>
           </a:p>
@@ -1230,7 +1230,7 @@
           <a:p>
             <a:fld id="{32F7251A-AE54-443C-B8FE-5F636E835EBF}" type="datetimeFigureOut">
               <a:rPr lang="en-US" smtClean="0"/>
-              <a:t>3/11/2018</a:t>
+              <a:t>6/3/2018</a:t>
             </a:fld>
             <a:endParaRPr lang="en-US"/>
           </a:p>
@@ -1594,7 +1594,7 @@
           <a:p>
             <a:fld id="{32F7251A-AE54-443C-B8FE-5F636E835EBF}" type="datetimeFigureOut">
               <a:rPr lang="en-US" smtClean="0"/>
-              <a:t>3/11/2018</a:t>
+              <a:t>6/3/2018</a:t>
             </a:fld>
             <a:endParaRPr lang="en-US"/>
           </a:p>
@@ -1711,7 +1711,7 @@
           <a:p>
             <a:fld id="{32F7251A-AE54-443C-B8FE-5F636E835EBF}" type="datetimeFigureOut">
               <a:rPr lang="en-US" smtClean="0"/>
-              <a:t>3/11/2018</a:t>
+              <a:t>6/3/2018</a:t>
             </a:fld>
             <a:endParaRPr lang="en-US"/>
           </a:p>
@@ -1806,7 +1806,7 @@
           <a:p>
             <a:fld id="{32F7251A-AE54-443C-B8FE-5F636E835EBF}" type="datetimeFigureOut">
               <a:rPr lang="en-US" smtClean="0"/>
-              <a:t>3/11/2018</a:t>
+              <a:t>6/3/2018</a:t>
             </a:fld>
             <a:endParaRPr lang="en-US"/>
           </a:p>
@@ -2081,7 +2081,7 @@
           <a:p>
             <a:fld id="{32F7251A-AE54-443C-B8FE-5F636E835EBF}" type="datetimeFigureOut">
               <a:rPr lang="en-US" smtClean="0"/>
-              <a:t>3/11/2018</a:t>
+              <a:t>6/3/2018</a:t>
             </a:fld>
             <a:endParaRPr lang="en-US"/>
           </a:p>
@@ -2333,7 +2333,7 @@
           <a:p>
             <a:fld id="{32F7251A-AE54-443C-B8FE-5F636E835EBF}" type="datetimeFigureOut">
               <a:rPr lang="en-US" smtClean="0"/>
-              <a:t>3/11/2018</a:t>
+              <a:t>6/3/2018</a:t>
             </a:fld>
             <a:endParaRPr lang="en-US"/>
           </a:p>
@@ -2547,7 +2547,7 @@
           <a:p>
             <a:fld id="{32F7251A-AE54-443C-B8FE-5F636E835EBF}" type="datetimeFigureOut">
               <a:rPr lang="en-US" smtClean="0"/>
-              <a:t>3/11/2018</a:t>
+              <a:t>6/3/2018</a:t>
             </a:fld>
             <a:endParaRPr lang="en-US"/>
           </a:p>
@@ -3038,7 +3038,7 @@
                   <a:schemeClr val="bg1"/>
                 </a:solidFill>
               </a:rPr>
-              <a:t>“Oh Master, Let Me Walk With Thee”</a:t>
+              <a:t>“O Master, Let Me Walk With Thee”</a:t>
             </a:r>
           </a:p>
         </p:txBody>
@@ -3124,7 +3124,7 @@
                   <a:schemeClr val="bg1"/>
                 </a:solidFill>
               </a:rPr>
-              <a:t>Help me the slow of heart to move</a:t>
+              <a:t>Help me, the slow of heart, to move</a:t>
             </a:r>
           </a:p>
           <a:p>
@@ -3146,7 +3146,7 @@
                   <a:schemeClr val="bg1"/>
                 </a:solidFill>
               </a:rPr>
-              <a:t>Teach me the wayward feet to stay,</a:t>
+              <a:t>Teach me, the wayward feet to stay,</a:t>
             </a:r>
           </a:p>
           <a:p>
@@ -3278,7 +3278,7 @@
                   <a:schemeClr val="bg1"/>
                 </a:solidFill>
               </a:rPr>
-              <a:t>“Oh Master, Let Me Walk With Thee”</a:t>
+              <a:t>“O Master, Let Me Walk With Thee”</a:t>
             </a:r>
           </a:p>
         </p:txBody>

</xml_diff>